<commit_message>
vault backup: 2024-07-02 09:33:19
</commit_message>
<xml_diff>
--- a/06-ppt/discussion/0701.pptx
+++ b/06-ppt/discussion/0701.pptx
@@ -20,20 +20,20 @@
   <p:notesSz cx="6858000" cy="9144000"/>
   <p:embeddedFontLst>
     <p:embeddedFont>
+      <p:font typeface="Cambria Math" panose="02040503050406030204" pitchFamily="18" charset="0"/>
+      <p:regular r:id="rId10"/>
+    </p:embeddedFont>
+    <p:embeddedFont>
+      <p:font typeface="DejaVu Math TeX Gyre" panose="02000503000000000000" pitchFamily="2" charset="0"/>
+      <p:regular r:id="rId11"/>
+    </p:embeddedFont>
+    <p:embeddedFont>
       <p:font typeface="等线" panose="02010600030101010101" pitchFamily="2" charset="-122"/>
-      <p:regular r:id="rId10"/>
-      <p:bold r:id="rId11"/>
+      <p:regular r:id="rId12"/>
+      <p:bold r:id="rId13"/>
     </p:embeddedFont>
     <p:embeddedFont>
       <p:font typeface="等线 Light" panose="02010600030101010101" pitchFamily="2" charset="-122"/>
-      <p:regular r:id="rId12"/>
-    </p:embeddedFont>
-    <p:embeddedFont>
-      <p:font typeface="Cambria Math" panose="02040503050406030204" pitchFamily="18" charset="0"/>
-      <p:regular r:id="rId13"/>
-    </p:embeddedFont>
-    <p:embeddedFont>
-      <p:font typeface="DejaVu Math TeX Gyre" panose="02000503000000000000" pitchFamily="2" charset="0"/>
       <p:regular r:id="rId14"/>
     </p:embeddedFont>
   </p:embeddedFontLst>
@@ -233,7 +233,7 @@
           <a:p>
             <a:fld id="{60A92938-FD9F-4358-9210-CF762F0206A4}" type="datetimeFigureOut">
               <a:rPr lang="zh-CN" altLang="en-US" smtClean="0"/>
-              <a:t>2024/6/30</a:t>
+              <a:t>2024/7/1</a:t>
             </a:fld>
             <a:endParaRPr lang="zh-CN" altLang="en-US"/>
           </a:p>
@@ -544,6 +544,118 @@
           <a:bodyPr/>
           <a:lstStyle/>
           <a:p>
+            <a:pPr marL="0" marR="0" lvl="0" indent="0" algn="l" defTabSz="914400" rtl="0" eaLnBrk="1" fontAlgn="auto" latinLnBrk="0" hangingPunct="1">
+              <a:lnSpc>
+                <a:spcPct val="100000"/>
+              </a:lnSpc>
+              <a:spcBef>
+                <a:spcPts val="0"/>
+              </a:spcBef>
+              <a:spcAft>
+                <a:spcPts val="0"/>
+              </a:spcAft>
+              <a:buClrTx/>
+              <a:buSzTx/>
+              <a:buFontTx/>
+              <a:buNone/>
+              <a:tabLst/>
+              <a:defRPr/>
+            </a:pPr>
+            <a:r>
+              <a:rPr lang="en-US" altLang="zh-CN" sz="1800" kern="100" dirty="0">
+                <a:effectLst/>
+                <a:latin typeface="Calibri" panose="020F0502020204030204" pitchFamily="34" charset="0"/>
+                <a:ea typeface="宋体" panose="02010600030101010101" pitchFamily="2" charset="-122"/>
+                <a:cs typeface="Times New Roman" panose="02020603050405020304" pitchFamily="18" charset="0"/>
+              </a:rPr>
+              <a:t>ROS2 consists of three basic units</a:t>
+            </a:r>
+          </a:p>
+          <a:p>
+            <a:endParaRPr lang="zh-CN" altLang="en-US" dirty="0"/>
+          </a:p>
+        </p:txBody>
+      </p:sp>
+      <p:sp>
+        <p:nvSpPr>
+          <p:cNvPr id="4" name="灯片编号占位符 3"/>
+          <p:cNvSpPr>
+            <a:spLocks noGrp="1"/>
+          </p:cNvSpPr>
+          <p:nvPr>
+            <p:ph type="sldNum" sz="quarter" idx="5"/>
+          </p:nvPr>
+        </p:nvSpPr>
+        <p:spPr/>
+        <p:txBody>
+          <a:bodyPr/>
+          <a:lstStyle/>
+          <a:p>
+            <a:fld id="{4E0213E6-8C4C-437E-84EC-B5D10E90E209}" type="slidenum">
+              <a:rPr lang="zh-CN" altLang="en-US" smtClean="0"/>
+              <a:t>2</a:t>
+            </a:fld>
+            <a:endParaRPr lang="zh-CN" altLang="en-US"/>
+          </a:p>
+        </p:txBody>
+      </p:sp>
+    </p:spTree>
+    <p:extLst>
+      <p:ext uri="{BB962C8B-B14F-4D97-AF65-F5344CB8AC3E}">
+        <p14:creationId xmlns:p14="http://schemas.microsoft.com/office/powerpoint/2010/main" val="510871990"/>
+      </p:ext>
+    </p:extLst>
+  </p:cSld>
+  <p:clrMapOvr>
+    <a:masterClrMapping/>
+  </p:clrMapOvr>
+</p:notes>
+</file>
+
+<file path=ppt/notesSlides/notesSlide2.xml><?xml version="1.0" encoding="utf-8"?>
+<p:notes xmlns:a="http://schemas.openxmlformats.org/drawingml/2006/main" xmlns:r="http://schemas.openxmlformats.org/officeDocument/2006/relationships" xmlns:p="http://schemas.openxmlformats.org/presentationml/2006/main">
+  <p:cSld>
+    <p:spTree>
+      <p:nvGrpSpPr>
+        <p:cNvPr id="1" name=""/>
+        <p:cNvGrpSpPr/>
+        <p:nvPr/>
+      </p:nvGrpSpPr>
+      <p:grpSpPr>
+        <a:xfrm>
+          <a:off x="0" y="0"/>
+          <a:ext cx="0" cy="0"/>
+          <a:chOff x="0" y="0"/>
+          <a:chExt cx="0" cy="0"/>
+        </a:xfrm>
+      </p:grpSpPr>
+      <p:sp>
+        <p:nvSpPr>
+          <p:cNvPr id="2" name="幻灯片图像占位符 1"/>
+          <p:cNvSpPr>
+            <a:spLocks noGrp="1" noRot="1" noChangeAspect="1"/>
+          </p:cNvSpPr>
+          <p:nvPr>
+            <p:ph type="sldImg"/>
+          </p:nvPr>
+        </p:nvSpPr>
+        <p:spPr/>
+      </p:sp>
+      <p:sp>
+        <p:nvSpPr>
+          <p:cNvPr id="3" name="备注占位符 2"/>
+          <p:cNvSpPr>
+            <a:spLocks noGrp="1"/>
+          </p:cNvSpPr>
+          <p:nvPr>
+            <p:ph type="body" idx="1"/>
+          </p:nvPr>
+        </p:nvSpPr>
+        <p:spPr/>
+        <p:txBody>
+          <a:bodyPr/>
+          <a:lstStyle/>
+          <a:p>
             <a:endParaRPr lang="zh-CN" altLang="en-US" dirty="0"/>
           </a:p>
         </p:txBody>
@@ -575,6 +687,136 @@
     <p:extLst>
       <p:ext uri="{BB962C8B-B14F-4D97-AF65-F5344CB8AC3E}">
         <p14:creationId xmlns:p14="http://schemas.microsoft.com/office/powerpoint/2010/main" val="1971515000"/>
+      </p:ext>
+    </p:extLst>
+  </p:cSld>
+  <p:clrMapOvr>
+    <a:masterClrMapping/>
+  </p:clrMapOvr>
+</p:notes>
+</file>
+
+<file path=ppt/notesSlides/notesSlide3.xml><?xml version="1.0" encoding="utf-8"?>
+<p:notes xmlns:a="http://schemas.openxmlformats.org/drawingml/2006/main" xmlns:r="http://schemas.openxmlformats.org/officeDocument/2006/relationships" xmlns:p="http://schemas.openxmlformats.org/presentationml/2006/main">
+  <p:cSld>
+    <p:spTree>
+      <p:nvGrpSpPr>
+        <p:cNvPr id="1" name=""/>
+        <p:cNvGrpSpPr/>
+        <p:nvPr/>
+      </p:nvGrpSpPr>
+      <p:grpSpPr>
+        <a:xfrm>
+          <a:off x="0" y="0"/>
+          <a:ext cx="0" cy="0"/>
+          <a:chOff x="0" y="0"/>
+          <a:chExt cx="0" cy="0"/>
+        </a:xfrm>
+      </p:grpSpPr>
+      <p:sp>
+        <p:nvSpPr>
+          <p:cNvPr id="2" name="幻灯片图像占位符 1"/>
+          <p:cNvSpPr>
+            <a:spLocks noGrp="1" noRot="1" noChangeAspect="1"/>
+          </p:cNvSpPr>
+          <p:nvPr>
+            <p:ph type="sldImg"/>
+          </p:nvPr>
+        </p:nvSpPr>
+        <p:spPr/>
+      </p:sp>
+      <p:sp>
+        <p:nvSpPr>
+          <p:cNvPr id="3" name="备注占位符 2"/>
+          <p:cNvSpPr>
+            <a:spLocks noGrp="1"/>
+          </p:cNvSpPr>
+          <p:nvPr>
+            <p:ph type="body" idx="1"/>
+          </p:nvPr>
+        </p:nvSpPr>
+        <p:spPr/>
+        <p:txBody>
+          <a:bodyPr/>
+          <a:lstStyle/>
+          <a:p>
+            <a:pPr marL="0" marR="0" lvl="0" indent="0" algn="l" defTabSz="914400" rtl="0" eaLnBrk="1" fontAlgn="auto" latinLnBrk="0" hangingPunct="1">
+              <a:lnSpc>
+                <a:spcPct val="100000"/>
+              </a:lnSpc>
+              <a:spcBef>
+                <a:spcPts val="0"/>
+              </a:spcBef>
+              <a:spcAft>
+                <a:spcPts val="0"/>
+              </a:spcAft>
+              <a:buClrTx/>
+              <a:buSzTx/>
+              <a:buFontTx/>
+              <a:buNone/>
+              <a:tabLst/>
+              <a:defRPr/>
+            </a:pPr>
+            <a:r>
+              <a:rPr lang="en-US" altLang="zh-CN" sz="1800" kern="100" dirty="0">
+                <a:effectLst/>
+                <a:latin typeface="Calibri" panose="020F0502020204030204" pitchFamily="34" charset="0"/>
+                <a:ea typeface="宋体" panose="02010600030101010101" pitchFamily="2" charset="-122"/>
+                <a:cs typeface="Times New Roman" panose="02020603050405020304" pitchFamily="18" charset="0"/>
+              </a:rPr>
+              <a:t>Modifying the thread scheduling policy and period will affect the operation of the ros2 program. However, the Linux system under the non-real-time kernel has a greater impact on the real-time performance of the ros2 program. Because other system processes have higher priority under the non-real-time kernel, even if we use "</a:t>
+            </a:r>
+            <a:r>
+              <a:rPr lang="en-US" altLang="zh-CN" sz="1800" kern="100" dirty="0" err="1">
+                <a:effectLst/>
+                <a:latin typeface="Calibri" panose="020F0502020204030204" pitchFamily="34" charset="0"/>
+                <a:ea typeface="宋体" panose="02010600030101010101" pitchFamily="2" charset="-122"/>
+                <a:cs typeface="Times New Roman" panose="02020603050405020304" pitchFamily="18" charset="0"/>
+              </a:rPr>
+              <a:t>chrt</a:t>
+            </a:r>
+            <a:r>
+              <a:rPr lang="en-US" altLang="zh-CN" sz="1800" kern="100" dirty="0">
+                <a:effectLst/>
+                <a:latin typeface="Calibri" panose="020F0502020204030204" pitchFamily="34" charset="0"/>
+                <a:ea typeface="宋体" panose="02010600030101010101" pitchFamily="2" charset="-122"/>
+                <a:cs typeface="Times New Roman" panose="02020603050405020304" pitchFamily="18" charset="0"/>
+              </a:rPr>
+              <a:t>" to modify the thread, it is not enough to improve performance.</a:t>
+            </a:r>
+          </a:p>
+          <a:p>
+            <a:endParaRPr lang="zh-CN" altLang="en-US" dirty="0"/>
+          </a:p>
+        </p:txBody>
+      </p:sp>
+      <p:sp>
+        <p:nvSpPr>
+          <p:cNvPr id="4" name="灯片编号占位符 3"/>
+          <p:cNvSpPr>
+            <a:spLocks noGrp="1"/>
+          </p:cNvSpPr>
+          <p:nvPr>
+            <p:ph type="sldNum" sz="quarter" idx="5"/>
+          </p:nvPr>
+        </p:nvSpPr>
+        <p:spPr/>
+        <p:txBody>
+          <a:bodyPr/>
+          <a:lstStyle/>
+          <a:p>
+            <a:fld id="{4E0213E6-8C4C-437E-84EC-B5D10E90E209}" type="slidenum">
+              <a:rPr lang="zh-CN" altLang="en-US" smtClean="0"/>
+              <a:t>6</a:t>
+            </a:fld>
+            <a:endParaRPr lang="zh-CN" altLang="en-US"/>
+          </a:p>
+        </p:txBody>
+      </p:sp>
+    </p:spTree>
+    <p:extLst>
+      <p:ext uri="{BB962C8B-B14F-4D97-AF65-F5344CB8AC3E}">
+        <p14:creationId xmlns:p14="http://schemas.microsoft.com/office/powerpoint/2010/main" val="1083276759"/>
       </p:ext>
     </p:extLst>
   </p:cSld>
@@ -713,7 +955,7 @@
           <a:p>
             <a:fld id="{51FD5836-1B78-4E70-983F-F8F353C30F27}" type="datetimeFigureOut">
               <a:rPr lang="zh-CN" altLang="en-US" smtClean="0"/>
-              <a:t>2024/6/30</a:t>
+              <a:t>2024/7/1</a:t>
             </a:fld>
             <a:endParaRPr lang="zh-CN" altLang="en-US"/>
           </a:p>
@@ -876,7 +1118,7 @@
           <a:p>
             <a:fld id="{51FD5836-1B78-4E70-983F-F8F353C30F27}" type="datetimeFigureOut">
               <a:rPr lang="zh-CN" altLang="en-US" smtClean="0"/>
-              <a:t>2024/6/30</a:t>
+              <a:t>2024/7/1</a:t>
             </a:fld>
             <a:endParaRPr lang="zh-CN" altLang="en-US"/>
           </a:p>
@@ -1049,7 +1291,7 @@
           <a:p>
             <a:fld id="{51FD5836-1B78-4E70-983F-F8F353C30F27}" type="datetimeFigureOut">
               <a:rPr lang="zh-CN" altLang="en-US" smtClean="0"/>
-              <a:t>2024/6/30</a:t>
+              <a:t>2024/7/1</a:t>
             </a:fld>
             <a:endParaRPr lang="zh-CN" altLang="en-US"/>
           </a:p>
@@ -1234,7 +1476,7 @@
           <a:p>
             <a:fld id="{51FD5836-1B78-4E70-983F-F8F353C30F27}" type="datetimeFigureOut">
               <a:rPr lang="zh-CN" altLang="en-US" smtClean="0"/>
-              <a:t>2024/6/30</a:t>
+              <a:t>2024/7/1</a:t>
             </a:fld>
             <a:endParaRPr lang="zh-CN" altLang="en-US"/>
           </a:p>
@@ -1397,7 +1639,7 @@
           <a:p>
             <a:fld id="{51FD5836-1B78-4E70-983F-F8F353C30F27}" type="datetimeFigureOut">
               <a:rPr lang="zh-CN" altLang="en-US" smtClean="0"/>
-              <a:t>2024/6/30</a:t>
+              <a:t>2024/7/1</a:t>
             </a:fld>
             <a:endParaRPr lang="zh-CN" altLang="en-US"/>
           </a:p>
@@ -1637,7 +1879,7 @@
           <a:p>
             <a:fld id="{51FD5836-1B78-4E70-983F-F8F353C30F27}" type="datetimeFigureOut">
               <a:rPr lang="zh-CN" altLang="en-US" smtClean="0"/>
-              <a:t>2024/6/30</a:t>
+              <a:t>2024/7/1</a:t>
             </a:fld>
             <a:endParaRPr lang="zh-CN" altLang="en-US"/>
           </a:p>
@@ -1861,7 +2103,7 @@
           <a:p>
             <a:fld id="{51FD5836-1B78-4E70-983F-F8F353C30F27}" type="datetimeFigureOut">
               <a:rPr lang="zh-CN" altLang="en-US" smtClean="0"/>
-              <a:t>2024/6/30</a:t>
+              <a:t>2024/7/1</a:t>
             </a:fld>
             <a:endParaRPr lang="zh-CN" altLang="en-US"/>
           </a:p>
@@ -2220,7 +2462,7 @@
           <a:p>
             <a:fld id="{51FD5836-1B78-4E70-983F-F8F353C30F27}" type="datetimeFigureOut">
               <a:rPr lang="zh-CN" altLang="en-US" smtClean="0"/>
-              <a:t>2024/6/30</a:t>
+              <a:t>2024/7/1</a:t>
             </a:fld>
             <a:endParaRPr lang="zh-CN" altLang="en-US"/>
           </a:p>
@@ -2332,7 +2574,7 @@
           <a:p>
             <a:fld id="{51FD5836-1B78-4E70-983F-F8F353C30F27}" type="datetimeFigureOut">
               <a:rPr lang="zh-CN" altLang="en-US" smtClean="0"/>
-              <a:t>2024/6/30</a:t>
+              <a:t>2024/7/1</a:t>
             </a:fld>
             <a:endParaRPr lang="zh-CN" altLang="en-US"/>
           </a:p>
@@ -2422,7 +2664,7 @@
           <a:p>
             <a:fld id="{51FD5836-1B78-4E70-983F-F8F353C30F27}" type="datetimeFigureOut">
               <a:rPr lang="zh-CN" altLang="en-US" smtClean="0"/>
-              <a:t>2024/6/30</a:t>
+              <a:t>2024/7/1</a:t>
             </a:fld>
             <a:endParaRPr lang="zh-CN" altLang="en-US"/>
           </a:p>
@@ -2692,7 +2934,7 @@
           <a:p>
             <a:fld id="{51FD5836-1B78-4E70-983F-F8F353C30F27}" type="datetimeFigureOut">
               <a:rPr lang="zh-CN" altLang="en-US" smtClean="0"/>
-              <a:t>2024/6/30</a:t>
+              <a:t>2024/7/1</a:t>
             </a:fld>
             <a:endParaRPr lang="zh-CN" altLang="en-US"/>
           </a:p>
@@ -2855,7 +3097,7 @@
           <a:p>
             <a:fld id="{51FD5836-1B78-4E70-983F-F8F353C30F27}" type="datetimeFigureOut">
               <a:rPr lang="zh-CN" altLang="en-US" smtClean="0"/>
-              <a:t>2024/6/30</a:t>
+              <a:t>2024/7/1</a:t>
             </a:fld>
             <a:endParaRPr lang="zh-CN" altLang="en-US"/>
           </a:p>
@@ -3102,7 +3344,7 @@
           <a:p>
             <a:fld id="{51FD5836-1B78-4E70-983F-F8F353C30F27}" type="datetimeFigureOut">
               <a:rPr lang="zh-CN" altLang="en-US" smtClean="0"/>
-              <a:t>2024/6/30</a:t>
+              <a:t>2024/7/1</a:t>
             </a:fld>
             <a:endParaRPr lang="zh-CN" altLang="en-US"/>
           </a:p>
@@ -3265,7 +3507,7 @@
           <a:p>
             <a:fld id="{51FD5836-1B78-4E70-983F-F8F353C30F27}" type="datetimeFigureOut">
               <a:rPr lang="zh-CN" altLang="en-US" smtClean="0"/>
-              <a:t>2024/6/30</a:t>
+              <a:t>2024/7/1</a:t>
             </a:fld>
             <a:endParaRPr lang="zh-CN" altLang="en-US"/>
           </a:p>
@@ -3438,7 +3680,7 @@
           <a:p>
             <a:fld id="{51FD5836-1B78-4E70-983F-F8F353C30F27}" type="datetimeFigureOut">
               <a:rPr lang="zh-CN" altLang="en-US" smtClean="0"/>
-              <a:t>2024/6/30</a:t>
+              <a:t>2024/7/1</a:t>
             </a:fld>
             <a:endParaRPr lang="zh-CN" altLang="en-US"/>
           </a:p>
@@ -3678,7 +3920,7 @@
           <a:p>
             <a:fld id="{51FD5836-1B78-4E70-983F-F8F353C30F27}" type="datetimeFigureOut">
               <a:rPr lang="zh-CN" altLang="en-US" smtClean="0"/>
-              <a:t>2024/6/30</a:t>
+              <a:t>2024/7/1</a:t>
             </a:fld>
             <a:endParaRPr lang="zh-CN" altLang="en-US"/>
           </a:p>
@@ -3902,7 +4144,7 @@
           <a:p>
             <a:fld id="{51FD5836-1B78-4E70-983F-F8F353C30F27}" type="datetimeFigureOut">
               <a:rPr lang="zh-CN" altLang="en-US" smtClean="0"/>
-              <a:t>2024/6/30</a:t>
+              <a:t>2024/7/1</a:t>
             </a:fld>
             <a:endParaRPr lang="zh-CN" altLang="en-US"/>
           </a:p>
@@ -4261,7 +4503,7 @@
           <a:p>
             <a:fld id="{51FD5836-1B78-4E70-983F-F8F353C30F27}" type="datetimeFigureOut">
               <a:rPr lang="zh-CN" altLang="en-US" smtClean="0"/>
-              <a:t>2024/6/30</a:t>
+              <a:t>2024/7/1</a:t>
             </a:fld>
             <a:endParaRPr lang="zh-CN" altLang="en-US"/>
           </a:p>
@@ -4373,7 +4615,7 @@
           <a:p>
             <a:fld id="{51FD5836-1B78-4E70-983F-F8F353C30F27}" type="datetimeFigureOut">
               <a:rPr lang="zh-CN" altLang="en-US" smtClean="0"/>
-              <a:t>2024/6/30</a:t>
+              <a:t>2024/7/1</a:t>
             </a:fld>
             <a:endParaRPr lang="zh-CN" altLang="en-US"/>
           </a:p>
@@ -4463,7 +4705,7 @@
           <a:p>
             <a:fld id="{51FD5836-1B78-4E70-983F-F8F353C30F27}" type="datetimeFigureOut">
               <a:rPr lang="zh-CN" altLang="en-US" smtClean="0"/>
-              <a:t>2024/6/30</a:t>
+              <a:t>2024/7/1</a:t>
             </a:fld>
             <a:endParaRPr lang="zh-CN" altLang="en-US"/>
           </a:p>
@@ -4733,7 +4975,7 @@
           <a:p>
             <a:fld id="{51FD5836-1B78-4E70-983F-F8F353C30F27}" type="datetimeFigureOut">
               <a:rPr lang="zh-CN" altLang="en-US" smtClean="0"/>
-              <a:t>2024/6/30</a:t>
+              <a:t>2024/7/1</a:t>
             </a:fld>
             <a:endParaRPr lang="zh-CN" altLang="en-US"/>
           </a:p>
@@ -4980,7 +5222,7 @@
           <a:p>
             <a:fld id="{51FD5836-1B78-4E70-983F-F8F353C30F27}" type="datetimeFigureOut">
               <a:rPr lang="zh-CN" altLang="en-US" smtClean="0"/>
-              <a:t>2024/6/30</a:t>
+              <a:t>2024/7/1</a:t>
             </a:fld>
             <a:endParaRPr lang="zh-CN" altLang="en-US"/>
           </a:p>
@@ -5186,7 +5428,7 @@
           <a:p>
             <a:fld id="{51FD5836-1B78-4E70-983F-F8F353C30F27}" type="datetimeFigureOut">
               <a:rPr lang="zh-CN" altLang="en-US" smtClean="0"/>
-              <a:t>2024/6/30</a:t>
+              <a:t>2024/7/1</a:t>
             </a:fld>
             <a:endParaRPr lang="zh-CN" altLang="en-US"/>
           </a:p>
@@ -5719,7 +5961,7 @@
           <a:p>
             <a:fld id="{51FD5836-1B78-4E70-983F-F8F353C30F27}" type="datetimeFigureOut">
               <a:rPr lang="zh-CN" altLang="en-US" smtClean="0"/>
-              <a:t>2024/6/30</a:t>
+              <a:t>2024/7/1</a:t>
             </a:fld>
             <a:endParaRPr lang="zh-CN" altLang="en-US"/>
           </a:p>
@@ -6234,7 +6476,7 @@
         </p:spPr>
         <p:txBody>
           <a:bodyPr>
-            <a:normAutofit lnSpcReduction="10000"/>
+            <a:normAutofit/>
           </a:bodyPr>
           <a:lstStyle/>
           <a:p>
@@ -6251,7 +6493,7 @@
             <a:pPr lvl="1"/>
             <a:r>
               <a:rPr lang="en-US" altLang="zh-CN" sz="1600" dirty="0"/>
-              <a:t>Including timer, subscription, service, and client callbacks.</a:t>
+              <a:t>Four types: timer, subscription, service, and client.</a:t>
             </a:r>
           </a:p>
           <a:p>
@@ -6280,7 +6522,7 @@
                   <a:schemeClr val="accent1"/>
                 </a:solidFill>
               </a:rPr>
-              <a:t>With priority attribute: Timer&gt;Subscription&gt;Service&gt;Client</a:t>
+              <a:t>With priority: Timer&gt;Subscription&gt;Service&gt;Client</a:t>
             </a:r>
           </a:p>
           <a:p>
@@ -6297,7 +6539,7 @@
             <a:pPr lvl="1"/>
             <a:r>
               <a:rPr lang="en-US" altLang="zh-CN" sz="1600" dirty="0"/>
-              <a:t>Nodes publish messages on a topic, and nodes subscribed to the topic process each message by activating a callback.</a:t>
+              <a:t>Nodes publish messages on a topic, and other nodes subscribed to the topic process each message by activating a callback.</a:t>
             </a:r>
             <a:r>
               <a:rPr lang="zh-CN" altLang="en-US" sz="1600" dirty="0"/>
@@ -6317,7 +6559,7 @@
             <a:pPr lvl="1"/>
             <a:r>
               <a:rPr lang="en-US" altLang="zh-CN" sz="1600" dirty="0"/>
-              <a:t>When processing multiple callback functions, ROS executes them sequentially in the order in which messages are received.</a:t>
+              <a:t>ROS executes callbacks in the order in which messages are received.</a:t>
             </a:r>
             <a:r>
               <a:rPr lang="zh-CN" altLang="en-US" sz="1600" dirty="0"/>
@@ -6329,7 +6571,7 @@
             <a:pPr lvl="1"/>
             <a:r>
               <a:rPr lang="en-US" altLang="zh-CN" sz="1600" dirty="0"/>
-              <a:t>Messages published by nodes to multiple topics are processed concurrently</a:t>
+              <a:t>Messages published to multiple topics are concurrently</a:t>
             </a:r>
           </a:p>
           <a:p>
@@ -6339,33 +6581,14 @@
             </a:r>
             <a:r>
               <a:rPr lang="en-US" altLang="zh-CN" sz="2000" dirty="0"/>
-              <a:t>: schedule callback execution</a:t>
+              <a:t>: Schedule and execute callbacks</a:t>
             </a:r>
           </a:p>
           <a:p>
             <a:pPr lvl="1"/>
             <a:r>
               <a:rPr lang="en-US" altLang="zh-CN" sz="1600" dirty="0"/>
-              <a:t>The executor itself occupies </a:t>
-            </a:r>
-            <a:r>
-              <a:rPr lang="en-US" altLang="zh-CN" sz="1600" b="1" dirty="0"/>
-              <a:t>a thread</a:t>
-            </a:r>
-            <a:endParaRPr lang="en-US" altLang="zh-CN" sz="1600" dirty="0"/>
-          </a:p>
-          <a:p>
-            <a:pPr lvl="1"/>
-            <a:r>
-              <a:rPr lang="en-US" altLang="zh-CN" sz="1600" dirty="0"/>
-              <a:t>Nodes are assigned to different executors, and all callbacks within the node are scheduled by this executor.</a:t>
-            </a:r>
-          </a:p>
-          <a:p>
-            <a:pPr lvl="1"/>
-            <a:r>
-              <a:rPr lang="en-US" altLang="zh-CN" sz="1600" dirty="0"/>
-              <a:t>Divided into single-threaded executors and multi-threaded executors</a:t>
+              <a:t>Nodes are assigned to different executors, and all callbacks within the node are scheduled by same executor.</a:t>
             </a:r>
           </a:p>
           <a:p>
@@ -6405,15 +6628,15 @@
           <p:nvPr/>
         </p:nvPicPr>
         <p:blipFill>
-          <a:blip r:embed="rId2"/>
+          <a:blip r:embed="rId3"/>
           <a:stretch>
             <a:fillRect/>
           </a:stretch>
         </p:blipFill>
         <p:spPr>
           <a:xfrm>
-            <a:off x="6793106" y="1366982"/>
-            <a:ext cx="5398894" cy="4124036"/>
+            <a:off x="6863445" y="1314228"/>
+            <a:ext cx="5185663" cy="3961156"/>
           </a:xfrm>
           <a:prstGeom prst="rect">
             <a:avLst/>
@@ -6507,7 +6730,7 @@
             </a:r>
             <a:r>
               <a:rPr lang="en-US" altLang="zh-CN" sz="1800" dirty="0"/>
-              <a:t>The executor reaches the polling point when it needs to select the next instance to execute but no instance is currently available.</a:t>
+              <a:t>The time when no instances are available and the executor selects the next instance to execute.</a:t>
             </a:r>
             <a:r>
               <a:rPr lang="zh-CN" altLang="en-US" sz="1800" dirty="0"/>
@@ -6539,7 +6762,7 @@
             </a:r>
             <a:r>
               <a:rPr lang="en-US" altLang="zh-CN" sz="1600" dirty="0"/>
-              <a:t> is empty, reaching the polling point</a:t>
+              <a:t> is empty, polling point is available</a:t>
             </a:r>
           </a:p>
           <a:p>
@@ -6562,7 +6785,23 @@
                   <a:schemeClr val="accent1"/>
                 </a:solidFill>
               </a:rPr>
-              <a:t>The timer callback does not need to wait for the polling point, only needs to wait for the scheduled arrival</a:t>
+              <a:t>note</a:t>
+            </a:r>
+            <a:r>
+              <a:rPr lang="zh-CN" altLang="en-US" sz="1600" b="1" dirty="0">
+                <a:solidFill>
+                  <a:schemeClr val="accent1"/>
+                </a:solidFill>
+              </a:rPr>
+              <a:t>：</a:t>
+            </a:r>
+            <a:r>
+              <a:rPr lang="en-US" altLang="zh-CN" sz="1600" b="1" dirty="0">
+                <a:solidFill>
+                  <a:schemeClr val="accent1"/>
+                </a:solidFill>
+              </a:rPr>
+              <a:t>The timer callback does not need to wait for the polling point, only needs to wait for timer</a:t>
             </a:r>
           </a:p>
           <a:p>
@@ -6584,21 +6823,14 @@
             <a:pPr lvl="1"/>
             <a:r>
               <a:rPr lang="en-US" altLang="zh-CN" sz="1600" dirty="0"/>
-              <a:t>The order in which instances are executed is determined by type priority:</a:t>
+              <a:t>The order in which instances are executed by type priority</a:t>
             </a:r>
           </a:p>
           <a:p>
             <a:pPr lvl="1"/>
             <a:r>
               <a:rPr lang="en-US" altLang="zh-CN" sz="1600" dirty="0"/>
-              <a:t>Timers&gt;Subscriptions&gt;Services&gt;Client</a:t>
-            </a:r>
-          </a:p>
-          <a:p>
-            <a:pPr lvl="1"/>
-            <a:r>
-              <a:rPr lang="en-US" altLang="zh-CN" sz="1600" dirty="0"/>
-              <a:t>When the type priorities are the same, compare the callback registration time, and the earlier registration time has higher priority.</a:t>
+              <a:t>When the priorities are the same, compare the callback registration time, and the earlier has higher priority.</a:t>
             </a:r>
           </a:p>
           <a:p>
@@ -6615,6 +6847,10 @@
               <a:rPr lang="en-US" altLang="zh-CN" sz="1600" dirty="0"/>
               <a:t> is empty.</a:t>
             </a:r>
+          </a:p>
+          <a:p>
+            <a:pPr lvl="1"/>
+            <a:endParaRPr lang="en-US" altLang="zh-CN" sz="1600" dirty="0"/>
           </a:p>
         </p:txBody>
       </p:sp>
@@ -6697,8 +6933,8 @@
           </a:p>
         </p:txBody>
       </p:sp>
-      <mc:AlternateContent xmlns:mc="http://schemas.openxmlformats.org/markup-compatibility/2006" xmlns:a14="http://schemas.microsoft.com/office/drawing/2010/main">
-        <mc:Choice Requires="a14">
+      <mc:AlternateContent xmlns:mc="http://schemas.openxmlformats.org/markup-compatibility/2006">
+        <mc:Choice xmlns:a14="http://schemas.microsoft.com/office/drawing/2010/main" Requires="a14">
           <p:sp>
             <p:nvSpPr>
               <p:cNvPr id="3" name="内容占位符 2"/>
@@ -6734,44 +6970,23 @@
               <a:p>
                 <a:r>
                   <a:rPr lang="en-US" altLang="zh-CN" sz="2000" dirty="0"/>
-                  <a:t>A callback chain can exist within a single executor, or span multiple executors.</a:t>
+                  <a:t>A callback chain can exist within a single executor, or multiple executors.</a:t>
                 </a:r>
               </a:p>
               <a:p>
                 <a:pPr lvl="1"/>
                 <a:r>
                   <a:rPr lang="en-US" altLang="zh-CN" sz="1600" dirty="0"/>
-                  <a:t>Similar to a chain of tasks (callbacks) scheduled on a single or multiple cores (single-threaded or </a:t>
-                </a:r>
-                <a:r>
-                  <a:rPr lang="en-US" altLang="zh-CN" sz="1600" dirty="0">
-                    <a:sym typeface="+mn-ea"/>
-                  </a:rPr>
-                  <a:t>Multi-threaded </a:t>
-                </a:r>
-                <a:r>
-                  <a:rPr lang="en-US" altLang="zh-CN" sz="1600" dirty="0"/>
-                  <a:t>executor), instances of tasks are similar to instances of callbacks</a:t>
+                  <a:t>Similar to a chain of tasks (callbacks) scheduled , instances of tasks are similar to instances of callbacks</a:t>
                 </a:r>
               </a:p>
               <a:p>
-                <a:pPr lvl="1"/>
                 <a:r>
-                  <a:rPr lang="en-US" altLang="zh-CN" sz="1600" dirty="0"/>
-                  <a:t>Callbacks only belong to one callback chain - single task chain model</a:t>
-                </a:r>
-              </a:p>
-              <a:p>
-                <a:pPr lvl="1"/>
-                <a:r>
-                  <a:rPr lang="en-US" altLang="zh-CN" sz="1600" dirty="0"/>
-                  <a:t>Callbacks can belong to multiple callback chains - DAG model</a:t>
-                </a:r>
-                <a:endParaRPr lang="en-US" altLang="zh-CN" sz="2000" dirty="0"/>
-              </a:p>
-              <a:p>
-                <a:r>
-                  <a:rPr lang="en-US" altLang="zh-CN" sz="2000" dirty="0"/>
+                  <a:rPr lang="en-US" altLang="zh-CN" sz="2000" b="1" dirty="0">
+                    <a:solidFill>
+                      <a:schemeClr val="accent1"/>
+                    </a:solidFill>
+                  </a:rPr>
                   <a:t>The callback chain usually starts with a timer callback, followed by regular callbacks.</a:t>
                 </a:r>
               </a:p>
@@ -6904,7 +7119,7 @@
                 </a14:m>
                 <a:r>
                   <a:rPr lang="en-US" altLang="zh-CN" sz="1600" dirty="0"/>
-                  <a:t>, </a:t>
+                  <a:t>,        </a:t>
                 </a:r>
                 <a14:m>
                   <m:oMath xmlns:m="http://schemas.openxmlformats.org/officeDocument/2006/math">
@@ -7006,7 +7221,7 @@
                 <a:pPr lvl="1"/>
                 <a:r>
                   <a:rPr lang="en-US" altLang="zh-CN" sz="1600" dirty="0"/>
-                  <a:t>An external event interface is added, which can publish messages to ROS2 nodes and trigger corresponding callbacks to continue processing.</a:t>
+                  <a:t>Add publish-subscribe interface for external events.</a:t>
                 </a:r>
               </a:p>
               <a:p>
@@ -7224,12 +7439,12 @@
             </p:txBody>
           </p:sp>
         </mc:Choice>
-        <mc:Fallback xmlns="">
+        <mc:Fallback>
           <p:sp>
             <p:nvSpPr>
               <p:cNvPr id="3" name="内容占位符 2"/>
               <p:cNvSpPr>
-                <a:spLocks noRot="1" noChangeAspect="1" noMove="1" noResize="1" noEditPoints="1" noAdjustHandles="1" noChangeArrowheads="1" noChangeShapeType="1" noTextEdit="1"/>
+                <a:spLocks noGrp="1" noRot="1" noChangeAspect="1" noMove="1" noResize="1" noEditPoints="1" noAdjustHandles="1" noChangeArrowheads="1" noChangeShapeType="1" noTextEdit="1"/>
               </p:cNvSpPr>
               <p:nvPr>
                 <p:ph idx="1"/>
@@ -7240,10 +7455,10 @@
                 <a:off x="0" y="575652"/>
                 <a:ext cx="12192000" cy="5753344"/>
               </a:xfrm>
-              <a:blipFill rotWithShape="1">
+              <a:blipFill>
                 <a:blip r:embed="rId2"/>
                 <a:stretch>
-                  <a:fillRect t="-6" b="10"/>
+                  <a:fillRect l="-450" t="-1059"/>
                 </a:stretch>
               </a:blipFill>
             </p:spPr>
@@ -7279,7 +7494,7 @@
         </p:blipFill>
         <p:spPr>
           <a:xfrm>
-            <a:off x="2228106" y="5486399"/>
+            <a:off x="2113806" y="4938283"/>
             <a:ext cx="2638653" cy="1096229"/>
           </a:xfrm>
           <a:prstGeom prst="rect">
@@ -7303,7 +7518,7 @@
         </p:blipFill>
         <p:spPr>
           <a:xfrm>
-            <a:off x="6632819" y="5290610"/>
+            <a:off x="6676781" y="4643422"/>
             <a:ext cx="4288155" cy="1487805"/>
           </a:xfrm>
           <a:prstGeom prst="rect">
@@ -7387,7 +7602,7 @@
         </p:spPr>
         <p:txBody>
           <a:bodyPr>
-            <a:normAutofit fontScale="40000" lnSpcReduction="20000"/>
+            <a:normAutofit fontScale="47500" lnSpcReduction="20000"/>
           </a:bodyPr>
           <a:lstStyle/>
           <a:p>
@@ -7407,8 +7622,13 @@
             <a:pPr lvl="1"/>
             <a:r>
               <a:rPr lang="en-US" altLang="zh-CN" sz="4000" dirty="0"/>
-              <a:t>The ros2 timer is triggered with a 1ms interval, and the callback does not set a sleep time.</a:t>
-            </a:r>
+              <a:t>The ros2 timer is triggered </a:t>
+            </a:r>
+            <a:r>
+              <a:rPr lang="en-US" altLang="zh-CN" sz="4000"/>
+              <a:t>with 1ms.</a:t>
+            </a:r>
+            <a:endParaRPr lang="en-US" altLang="zh-CN" sz="4000" dirty="0"/>
           </a:p>
           <a:p>
             <a:pPr lvl="1"/>
@@ -7421,14 +7641,11 @@
             <a:pPr lvl="1"/>
             <a:r>
               <a:rPr lang="en-US" altLang="zh-CN" sz="4000" dirty="0"/>
-              <a:t>Full load test</a:t>
-            </a:r>
-          </a:p>
-          <a:p>
-            <a:pPr lvl="1"/>
+              <a:t>Full load and </a:t>
+            </a:r>
             <a:r>
               <a:rPr lang="fr-FR" altLang="zh-CN" sz="4000" dirty="0"/>
-              <a:t>Change ros2 process cycle, etc.</a:t>
+              <a:t>Change ros2 process cycle.</a:t>
             </a:r>
             <a:endParaRPr lang="en-US" altLang="zh-CN" sz="4000" dirty="0"/>
           </a:p>
@@ -7444,7 +7661,7 @@
             </a:r>
             <a:r>
               <a:rPr lang="en-US" altLang="zh-CN" sz="4000" dirty="0"/>
-              <a:t> to track "</a:t>
+              <a:t> tool to track "</a:t>
             </a:r>
             <a:r>
               <a:rPr lang="en-US" altLang="zh-CN" sz="4000" dirty="0" err="1"/>
@@ -7452,7 +7669,7 @@
             </a:r>
             <a:r>
               <a:rPr lang="en-US" altLang="zh-CN" sz="4000" dirty="0"/>
-              <a:t>", </a:t>
+              <a:t>“ event, </a:t>
             </a:r>
             <a:r>
               <a:rPr lang="en-US" altLang="zh-CN" sz="4000" dirty="0" err="1"/>
@@ -7557,8 +7774,8 @@
         </p:nvSpPr>
         <p:spPr>
           <a:xfrm>
-            <a:off x="6288039" y="2585622"/>
-            <a:ext cx="5097999" cy="369332"/>
+            <a:off x="6288039" y="2646292"/>
+            <a:ext cx="5097999" cy="338554"/>
           </a:xfrm>
           <a:prstGeom prst="rect">
             <a:avLst/>
@@ -7572,14 +7789,14 @@
           <a:lstStyle/>
           <a:p>
             <a:r>
-              <a:rPr lang="zh-CN" altLang="en-US" sz="1800" dirty="0"/>
+              <a:rPr lang="zh-CN" altLang="en-US" sz="1600" dirty="0"/>
               <a:t> </a:t>
             </a:r>
             <a:r>
-              <a:rPr lang="en-US" altLang="zh-CN" sz="1800" dirty="0"/>
+              <a:rPr lang="en-US" altLang="zh-CN" sz="1600" dirty="0"/>
               <a:t>2. Full load is often disturbed</a:t>
             </a:r>
-            <a:endParaRPr lang="zh-CN" altLang="en-US" dirty="0"/>
+            <a:endParaRPr lang="zh-CN" altLang="en-US" sz="1600" dirty="0"/>
           </a:p>
         </p:txBody>
       </p:sp>
@@ -7597,8 +7814,8 @@
         </p:nvSpPr>
         <p:spPr>
           <a:xfrm>
-            <a:off x="-26062" y="2523337"/>
-            <a:ext cx="6122062" cy="1200329"/>
+            <a:off x="0" y="2646292"/>
+            <a:ext cx="6122062" cy="1107996"/>
           </a:xfrm>
           <a:prstGeom prst="rect">
             <a:avLst/>
@@ -7615,8 +7832,8 @@
               <a:buNone/>
             </a:pPr>
             <a:r>
-              <a:rPr lang="en-US" altLang="zh-CN" sz="1800" dirty="0"/>
-              <a:t>1. Without full load, the callback chain cycle can basically maintain 1ms</a:t>
+              <a:rPr lang="en-US" altLang="zh-CN" sz="1600" dirty="0"/>
+              <a:t>1. Without full load, the callback chain period can basically maintain 1ms</a:t>
             </a:r>
           </a:p>
           <a:p>
@@ -7624,12 +7841,17 @@
               <a:buNone/>
             </a:pPr>
             <a:r>
-              <a:rPr lang="en-US" altLang="zh-CN" sz="1800" dirty="0"/>
-              <a:t> (satisfying the timer configuration</a:t>
-            </a:r>
-          </a:p>
-          <a:p>
-            <a:endParaRPr lang="zh-CN" altLang="en-US" dirty="0"/>
+              <a:rPr lang="en-US" altLang="zh-CN" sz="1600" dirty="0"/>
+              <a:t> (timer configuration = 1ms</a:t>
+            </a:r>
+            <a:r>
+              <a:rPr lang="zh-CN" altLang="en-US" sz="1600" dirty="0"/>
+              <a:t>）</a:t>
+            </a:r>
+            <a:endParaRPr lang="en-US" altLang="zh-CN" sz="1600" dirty="0"/>
+          </a:p>
+          <a:p>
+            <a:endParaRPr lang="zh-CN" altLang="en-US" sz="1600" dirty="0"/>
           </a:p>
         </p:txBody>
       </p:sp>
@@ -7712,7 +7934,7 @@
           <a:p>
             <a:r>
               <a:rPr lang="en-US" altLang="zh-CN" sz="1600" dirty="0"/>
-              <a:t>Modify the cycle to 50ms. At this time, the load is full and the number of delays in the cycle is high.</a:t>
+              <a:t>3.Modify the period to 50ms. Then the load is full and the number of delays in the period become high.</a:t>
             </a:r>
           </a:p>
           <a:p>
@@ -7739,7 +7961,7 @@
           <p:nvPr/>
         </p:nvPicPr>
         <p:blipFill>
-          <a:blip r:embed="rId2" cstate="print">
+          <a:blip r:embed="rId3" cstate="print">
             <a:extLst>
               <a:ext uri="{28A0092B-C50C-407E-A947-70E740481C1C}">
                 <a14:useLocalDpi xmlns:a14="http://schemas.microsoft.com/office/drawing/2010/main" val="0"/>
@@ -7954,7 +8176,7 @@
           <a:p>
             <a:r>
               <a:rPr lang="en-US" altLang="zh-CN" sz="1600" dirty="0"/>
-              <a:t>When the load is not full, adjust the priority and cycle, and keep the cycle basically at 50ms</a:t>
+              <a:t>4.When the load is not full, modify the priority and period, and keep the period basically at 50ms</a:t>
             </a:r>
           </a:p>
         </p:txBody>
@@ -7974,7 +8196,7 @@
           <p:nvPr/>
         </p:nvPicPr>
         <p:blipFill>
-          <a:blip r:embed="rId3">
+          <a:blip r:embed="rId4">
             <a:extLst>
               <a:ext uri="{28A0092B-C50C-407E-A947-70E740481C1C}">
                 <a14:useLocalDpi xmlns:a14="http://schemas.microsoft.com/office/drawing/2010/main" val="0"/>
@@ -8009,8 +8231,8 @@
         </p:nvSpPr>
         <p:spPr>
           <a:xfrm>
-            <a:off x="579000" y="5173557"/>
-            <a:ext cx="8973670" cy="1754326"/>
+            <a:off x="614170" y="5268382"/>
+            <a:ext cx="8973670" cy="1354217"/>
           </a:xfrm>
           <a:prstGeom prst="rect">
             <a:avLst/>
@@ -8024,16 +8246,16 @@
           <a:lstStyle/>
           <a:p>
             <a:r>
-              <a:rPr lang="en-US" altLang="zh-CN" dirty="0">
+              <a:rPr lang="en-US" altLang="zh-CN" sz="1600" dirty="0">
                 <a:solidFill>
                   <a:srgbClr val="FF0000"/>
                 </a:solidFill>
               </a:rPr>
-              <a:t>Under the non-real-time kernel, the DEADLINE policy priority is only 0, and only the cycle, execution time, and deadline can be modified.</a:t>
-            </a:r>
-          </a:p>
-          <a:p>
-            <a:endParaRPr lang="en-US" altLang="zh-CN" dirty="0">
+              <a:t>Under the non-real-time kernel, the DEADLINE policy priority is only 0, and only the period, execution time, and deadline can be modified.</a:t>
+            </a:r>
+          </a:p>
+          <a:p>
+            <a:endParaRPr lang="en-US" altLang="zh-CN" sz="1600" dirty="0">
               <a:solidFill>
                 <a:srgbClr val="FF0000"/>
               </a:solidFill>
@@ -8041,7 +8263,7 @@
           </a:p>
           <a:p>
             <a:r>
-              <a:rPr lang="en-US" altLang="zh-CN" dirty="0">
+              <a:rPr lang="en-US" altLang="zh-CN" sz="1600" dirty="0">
                 <a:solidFill>
                   <a:srgbClr val="FF0000"/>
                 </a:solidFill>
@@ -8049,7 +8271,7 @@
               <a:t>There are related work tests, and the </a:t>
             </a:r>
             <a:r>
-              <a:rPr lang="en-US" altLang="zh-CN" dirty="0" err="1">
+              <a:rPr lang="en-US" altLang="zh-CN" sz="1600" dirty="0" err="1">
                 <a:solidFill>
                   <a:srgbClr val="FF0000"/>
                 </a:solidFill>
@@ -8057,7 +8279,7 @@
               <a:t>preempt_RT</a:t>
             </a:r>
             <a:r>
-              <a:rPr lang="en-US" altLang="zh-CN" dirty="0">
+              <a:rPr lang="en-US" altLang="zh-CN" sz="1600" dirty="0">
                 <a:solidFill>
                   <a:srgbClr val="FF0000"/>
                 </a:solidFill>
@@ -8067,7 +8289,7 @@
           </a:p>
           <a:p>
             <a:r>
-              <a:rPr lang="zh-CN" altLang="en-US" dirty="0">
+              <a:rPr lang="zh-CN" altLang="en-US" sz="1600" dirty="0">
                 <a:solidFill>
                   <a:srgbClr val="FF0000"/>
                 </a:solidFill>
@@ -8075,7 +8297,7 @@
               <a:t>“</a:t>
             </a:r>
             <a:r>
-              <a:rPr lang="en-US" altLang="zh-CN" dirty="0">
+              <a:rPr lang="en-US" altLang="zh-CN" sz="1600" dirty="0">
                 <a:solidFill>
                   <a:srgbClr val="FF0000"/>
                 </a:solidFill>
@@ -8083,7 +8305,7 @@
               <a:t>ROS2 Real-time Performance Optimization and Evaluation</a:t>
             </a:r>
             <a:r>
-              <a:rPr lang="zh-CN" altLang="en-US" dirty="0">
+              <a:rPr lang="zh-CN" altLang="en-US" sz="1600" dirty="0">
                 <a:solidFill>
                   <a:srgbClr val="FF0000"/>
                 </a:solidFill>

</xml_diff>